<commit_message>
adding palmetto + pca from 244
</commit_message>
<xml_diff>
--- a/posts/2025-03-09-data-vis-infographic/www/volc_viz.pptx
+++ b/posts/2025-03-09-data-vis-infographic/www/volc_viz.pptx
@@ -3341,13 +3341,13 @@
         </p:nvPicPr>
         <p:blipFill>
           <a:blip r:embed="rId2"/>
-          <a:srcRect t="610"/>
+          <a:srcRect l="-1" t="610" r="1160" b="3272"/>
           <a:stretch/>
         </p:blipFill>
         <p:spPr>
           <a:xfrm>
-            <a:off x="-11882" y="4992791"/>
-            <a:ext cx="6858000" cy="3236878"/>
+            <a:off x="-11882" y="4992792"/>
+            <a:ext cx="6869882" cy="3236808"/>
           </a:xfrm>
           <a:prstGeom prst="rect">
             <a:avLst/>

</xml_diff>